<commit_message>
update tex manager and mapping table use
</commit_message>
<xml_diff>
--- a/doc/Lod.pptx
+++ b/doc/Lod.pptx
@@ -6,6 +6,8 @@
   </p:sldMasterIdLst>
   <p:sldIdLst>
     <p:sldId id="256" r:id="rId2"/>
+    <p:sldId id="257" r:id="rId3"/>
+    <p:sldId id="258" r:id="rId4"/>
   </p:sldIdLst>
   <p:sldSz cx="12192000" cy="6858000"/>
   <p:notesSz cx="6858000" cy="9144000"/>
@@ -104,6 +106,11 @@
       </a:defRPr>
     </a:lvl9pPr>
   </p:defaultTextStyle>
+  <p:extLst>
+    <p:ext uri="{EFAFB233-063F-42B5-8137-9DF3F51BA10A}">
+      <p15:sldGuideLst xmlns:p15="http://schemas.microsoft.com/office/powerpoint/2012/main"/>
+    </p:ext>
+  </p:extLst>
 </p:presentation>
 </file>
 
@@ -254,7 +261,7 @@
           <a:p>
             <a:fld id="{4FDF0321-5356-4987-A9FA-81E61FFF238F}" type="datetimeFigureOut">
               <a:rPr lang="zh-CN" altLang="en-US" smtClean="0"/>
-              <a:t>2021/5/3</a:t>
+              <a:t>2021/5/12</a:t>
             </a:fld>
             <a:endParaRPr lang="zh-CN" altLang="en-US"/>
           </a:p>
@@ -452,7 +459,7 @@
           <a:p>
             <a:fld id="{4FDF0321-5356-4987-A9FA-81E61FFF238F}" type="datetimeFigureOut">
               <a:rPr lang="zh-CN" altLang="en-US" smtClean="0"/>
-              <a:t>2021/5/3</a:t>
+              <a:t>2021/5/12</a:t>
             </a:fld>
             <a:endParaRPr lang="zh-CN" altLang="en-US"/>
           </a:p>
@@ -660,7 +667,7 @@
           <a:p>
             <a:fld id="{4FDF0321-5356-4987-A9FA-81E61FFF238F}" type="datetimeFigureOut">
               <a:rPr lang="zh-CN" altLang="en-US" smtClean="0"/>
-              <a:t>2021/5/3</a:t>
+              <a:t>2021/5/12</a:t>
             </a:fld>
             <a:endParaRPr lang="zh-CN" altLang="en-US"/>
           </a:p>
@@ -858,7 +865,7 @@
           <a:p>
             <a:fld id="{4FDF0321-5356-4987-A9FA-81E61FFF238F}" type="datetimeFigureOut">
               <a:rPr lang="zh-CN" altLang="en-US" smtClean="0"/>
-              <a:t>2021/5/3</a:t>
+              <a:t>2021/5/12</a:t>
             </a:fld>
             <a:endParaRPr lang="zh-CN" altLang="en-US"/>
           </a:p>
@@ -1133,7 +1140,7 @@
           <a:p>
             <a:fld id="{4FDF0321-5356-4987-A9FA-81E61FFF238F}" type="datetimeFigureOut">
               <a:rPr lang="zh-CN" altLang="en-US" smtClean="0"/>
-              <a:t>2021/5/3</a:t>
+              <a:t>2021/5/12</a:t>
             </a:fld>
             <a:endParaRPr lang="zh-CN" altLang="en-US"/>
           </a:p>
@@ -1398,7 +1405,7 @@
           <a:p>
             <a:fld id="{4FDF0321-5356-4987-A9FA-81E61FFF238F}" type="datetimeFigureOut">
               <a:rPr lang="zh-CN" altLang="en-US" smtClean="0"/>
-              <a:t>2021/5/3</a:t>
+              <a:t>2021/5/12</a:t>
             </a:fld>
             <a:endParaRPr lang="zh-CN" altLang="en-US"/>
           </a:p>
@@ -1810,7 +1817,7 @@
           <a:p>
             <a:fld id="{4FDF0321-5356-4987-A9FA-81E61FFF238F}" type="datetimeFigureOut">
               <a:rPr lang="zh-CN" altLang="en-US" smtClean="0"/>
-              <a:t>2021/5/3</a:t>
+              <a:t>2021/5/12</a:t>
             </a:fld>
             <a:endParaRPr lang="zh-CN" altLang="en-US"/>
           </a:p>
@@ -1951,7 +1958,7 @@
           <a:p>
             <a:fld id="{4FDF0321-5356-4987-A9FA-81E61FFF238F}" type="datetimeFigureOut">
               <a:rPr lang="zh-CN" altLang="en-US" smtClean="0"/>
-              <a:t>2021/5/3</a:t>
+              <a:t>2021/5/12</a:t>
             </a:fld>
             <a:endParaRPr lang="zh-CN" altLang="en-US"/>
           </a:p>
@@ -2064,7 +2071,7 @@
           <a:p>
             <a:fld id="{4FDF0321-5356-4987-A9FA-81E61FFF238F}" type="datetimeFigureOut">
               <a:rPr lang="zh-CN" altLang="en-US" smtClean="0"/>
-              <a:t>2021/5/3</a:t>
+              <a:t>2021/5/12</a:t>
             </a:fld>
             <a:endParaRPr lang="zh-CN" altLang="en-US"/>
           </a:p>
@@ -2375,7 +2382,7 @@
           <a:p>
             <a:fld id="{4FDF0321-5356-4987-A9FA-81E61FFF238F}" type="datetimeFigureOut">
               <a:rPr lang="zh-CN" altLang="en-US" smtClean="0"/>
-              <a:t>2021/5/3</a:t>
+              <a:t>2021/5/12</a:t>
             </a:fld>
             <a:endParaRPr lang="zh-CN" altLang="en-US"/>
           </a:p>
@@ -2663,7 +2670,7 @@
           <a:p>
             <a:fld id="{4FDF0321-5356-4987-A9FA-81E61FFF238F}" type="datetimeFigureOut">
               <a:rPr lang="zh-CN" altLang="en-US" smtClean="0"/>
-              <a:t>2021/5/3</a:t>
+              <a:t>2021/5/12</a:t>
             </a:fld>
             <a:endParaRPr lang="zh-CN" altLang="en-US"/>
           </a:p>
@@ -2904,7 +2911,7 @@
           <a:p>
             <a:fld id="{4FDF0321-5356-4987-A9FA-81E61FFF238F}" type="datetimeFigureOut">
               <a:rPr lang="zh-CN" altLang="en-US" smtClean="0"/>
-              <a:t>2021/5/3</a:t>
+              <a:t>2021/5/12</a:t>
             </a:fld>
             <a:endParaRPr lang="zh-CN" altLang="en-US"/>
           </a:p>
@@ -12068,6 +12075,429 @@
 </p:sld>
 </file>
 
+<file path=ppt/slides/slide2.xml><?xml version="1.0" encoding="utf-8"?>
+<p:sld xmlns:a="http://schemas.openxmlformats.org/drawingml/2006/main" xmlns:r="http://schemas.openxmlformats.org/officeDocument/2006/relationships" xmlns:p="http://schemas.openxmlformats.org/presentationml/2006/main">
+  <p:cSld>
+    <p:spTree>
+      <p:nvGrpSpPr>
+        <p:cNvPr id="1" name=""/>
+        <p:cNvGrpSpPr/>
+        <p:nvPr/>
+      </p:nvGrpSpPr>
+      <p:grpSpPr>
+        <a:xfrm>
+          <a:off x="0" y="0"/>
+          <a:ext cx="0" cy="0"/>
+          <a:chOff x="0" y="0"/>
+          <a:chExt cx="0" cy="0"/>
+        </a:xfrm>
+      </p:grpSpPr>
+      <p:sp>
+        <p:nvSpPr>
+          <p:cNvPr id="4" name="文本框 3">
+            <a:extLst>
+              <a:ext uri="{FF2B5EF4-FFF2-40B4-BE49-F238E27FC236}">
+                <a16:creationId xmlns:a16="http://schemas.microsoft.com/office/drawing/2014/main" id="{891FC8D8-B6D8-42E2-83FA-4A873C352E75}"/>
+              </a:ext>
+            </a:extLst>
+          </p:cNvPr>
+          <p:cNvSpPr txBox="1"/>
+          <p:nvPr/>
+        </p:nvSpPr>
+        <p:spPr>
+          <a:xfrm>
+            <a:off x="130627" y="65313"/>
+            <a:ext cx="11960679" cy="6463308"/>
+          </a:xfrm>
+          <a:prstGeom prst="rect">
+            <a:avLst/>
+          </a:prstGeom>
+          <a:noFill/>
+        </p:spPr>
+        <p:txBody>
+          <a:bodyPr wrap="square" rtlCol="0">
+            <a:spAutoFit/>
+          </a:bodyPr>
+          <a:lstStyle/>
+          <a:p>
+            <a:r>
+              <a:rPr lang="zh-CN" altLang="en-US" dirty="0"/>
+              <a:t>在前进过程中，每帧的绘制前，都需要计算当前帧与相机视空间相交的那些块，此时计算的是原始</a:t>
+            </a:r>
+            <a:r>
+              <a:rPr lang="en-US" altLang="zh-CN" dirty="0" err="1"/>
+              <a:t>lod</a:t>
+            </a:r>
+            <a:r>
+              <a:rPr lang="zh-CN" altLang="en-US" dirty="0"/>
+              <a:t>的块，对其进行</a:t>
+            </a:r>
+            <a:r>
+              <a:rPr lang="en-US" altLang="zh-CN" dirty="0"/>
+              <a:t>refine</a:t>
+            </a:r>
+            <a:r>
+              <a:rPr lang="zh-CN" altLang="en-US" dirty="0"/>
+              <a:t>，得到各个</a:t>
+            </a:r>
+            <a:r>
+              <a:rPr lang="en-US" altLang="zh-CN" dirty="0" err="1"/>
+              <a:t>lod</a:t>
+            </a:r>
+            <a:r>
+              <a:rPr lang="zh-CN" altLang="en-US" dirty="0"/>
+              <a:t>需要的块，将其与上一帧的各个</a:t>
+            </a:r>
+            <a:r>
+              <a:rPr lang="en-US" altLang="zh-CN" dirty="0" err="1"/>
+              <a:t>lod</a:t>
+            </a:r>
+            <a:r>
+              <a:rPr lang="zh-CN" altLang="en-US" dirty="0"/>
+              <a:t>需要的块进行比较</a:t>
+            </a:r>
+            <a:endParaRPr lang="en-US" altLang="zh-CN" dirty="0"/>
+          </a:p>
+          <a:p>
+            <a:r>
+              <a:rPr lang="en-US" altLang="zh-CN" dirty="0" err="1"/>
+              <a:t>Mapping_table</a:t>
+            </a:r>
+            <a:r>
+              <a:rPr lang="en-US" altLang="zh-CN" dirty="0"/>
+              <a:t> </a:t>
+            </a:r>
+            <a:r>
+              <a:rPr lang="zh-CN" altLang="en-US" dirty="0"/>
+              <a:t>只记载每个虚拟块对应的物理块是否加载，如果加载了那么物理块信息是什么，</a:t>
+            </a:r>
+            <a:endParaRPr lang="en-US" altLang="zh-CN" dirty="0"/>
+          </a:p>
+          <a:p>
+            <a:r>
+              <a:rPr lang="zh-CN" altLang="en-US" dirty="0"/>
+              <a:t>也就是说 </a:t>
+            </a:r>
+            <a:r>
+              <a:rPr lang="en-US" altLang="zh-CN" dirty="0"/>
+              <a:t>flag</a:t>
+            </a:r>
+            <a:r>
+              <a:rPr lang="zh-CN" altLang="en-US" dirty="0"/>
+              <a:t>只有</a:t>
+            </a:r>
+            <a:r>
+              <a:rPr lang="en-US" altLang="zh-CN" dirty="0"/>
+              <a:t>0</a:t>
+            </a:r>
+            <a:r>
+              <a:rPr lang="zh-CN" altLang="en-US" dirty="0"/>
+              <a:t>和</a:t>
+            </a:r>
+            <a:r>
+              <a:rPr lang="en-US" altLang="zh-CN" dirty="0"/>
+              <a:t>1</a:t>
+            </a:r>
+            <a:r>
+              <a:rPr lang="zh-CN" altLang="en-US" dirty="0"/>
+              <a:t>，不需要中间的等待加载</a:t>
+            </a:r>
+            <a:r>
+              <a:rPr lang="en-US" altLang="zh-CN" dirty="0"/>
+              <a:t>2</a:t>
+            </a:r>
+          </a:p>
+          <a:p>
+            <a:r>
+              <a:rPr lang="zh-CN" altLang="en-US" dirty="0"/>
+              <a:t>如果</a:t>
+            </a:r>
+            <a:r>
+              <a:rPr lang="en-US" altLang="zh-CN" dirty="0"/>
+              <a:t>flag</a:t>
+            </a:r>
+            <a:r>
+              <a:rPr lang="zh-CN" altLang="en-US" dirty="0"/>
+              <a:t>是</a:t>
+            </a:r>
+            <a:r>
+              <a:rPr lang="en-US" altLang="zh-CN" dirty="0"/>
+              <a:t>0 </a:t>
+            </a:r>
+            <a:r>
+              <a:rPr lang="zh-CN" altLang="en-US" dirty="0"/>
+              <a:t>那么加倍</a:t>
+            </a:r>
+            <a:r>
+              <a:rPr lang="en-US" altLang="zh-CN" dirty="0" err="1"/>
+              <a:t>lod</a:t>
+            </a:r>
+            <a:r>
+              <a:rPr lang="zh-CN" altLang="en-US" dirty="0"/>
+              <a:t>采样，直到</a:t>
+            </a:r>
+            <a:r>
+              <a:rPr lang="en-US" altLang="zh-CN" dirty="0" err="1"/>
+              <a:t>max_lod</a:t>
+            </a:r>
+            <a:endParaRPr lang="en-US" altLang="zh-CN" dirty="0"/>
+          </a:p>
+          <a:p>
+            <a:r>
+              <a:rPr lang="zh-CN" altLang="en-US" dirty="0"/>
+              <a:t>如果</a:t>
+            </a:r>
+            <a:r>
+              <a:rPr lang="en-US" altLang="zh-CN" dirty="0"/>
+              <a:t>flag</a:t>
+            </a:r>
+            <a:r>
+              <a:rPr lang="zh-CN" altLang="en-US" dirty="0"/>
+              <a:t>是</a:t>
+            </a:r>
+            <a:r>
+              <a:rPr lang="en-US" altLang="zh-CN" dirty="0"/>
+              <a:t>1</a:t>
+            </a:r>
+            <a:r>
+              <a:rPr lang="zh-CN" altLang="en-US" dirty="0"/>
+              <a:t>，正常采样</a:t>
+            </a:r>
+            <a:endParaRPr lang="en-US" altLang="zh-CN" dirty="0"/>
+          </a:p>
+          <a:p>
+            <a:endParaRPr lang="en-US" altLang="zh-CN" dirty="0"/>
+          </a:p>
+          <a:p>
+            <a:r>
+              <a:rPr lang="zh-CN" altLang="en-US" dirty="0"/>
+              <a:t>每次的</a:t>
+            </a:r>
+            <a:r>
+              <a:rPr lang="en-US" altLang="zh-CN" dirty="0" err="1"/>
+              <a:t>no_need_blocks</a:t>
+            </a:r>
+            <a:r>
+              <a:rPr lang="zh-CN" altLang="en-US" dirty="0"/>
+              <a:t>，不一定要马上更新对应的</a:t>
+            </a:r>
+            <a:r>
+              <a:rPr lang="en-US" altLang="zh-CN" dirty="0" err="1"/>
+              <a:t>mapping_table</a:t>
+            </a:r>
+            <a:r>
+              <a:rPr lang="zh-CN" altLang="en-US" dirty="0"/>
+              <a:t>的</a:t>
+            </a:r>
+            <a:r>
+              <a:rPr lang="en-US" altLang="zh-CN" dirty="0"/>
+              <a:t>flag</a:t>
+            </a:r>
+            <a:r>
+              <a:rPr lang="zh-CN" altLang="en-US" dirty="0"/>
+              <a:t>为</a:t>
+            </a:r>
+            <a:r>
+              <a:rPr lang="en-US" altLang="zh-CN" dirty="0"/>
+              <a:t>0</a:t>
+            </a:r>
+          </a:p>
+          <a:p>
+            <a:r>
+              <a:rPr lang="zh-CN" altLang="en-US" dirty="0"/>
+              <a:t>因为</a:t>
+            </a:r>
+            <a:r>
+              <a:rPr lang="en-US" altLang="zh-CN" dirty="0" err="1"/>
+              <a:t>new_need_blocks</a:t>
+            </a:r>
+            <a:r>
+              <a:rPr lang="zh-CN" altLang="en-US" dirty="0"/>
+              <a:t>的加载需要一定时间 主要是解码操作，</a:t>
+            </a:r>
+            <a:endParaRPr lang="en-US" altLang="zh-CN" dirty="0"/>
+          </a:p>
+          <a:p>
+            <a:r>
+              <a:rPr lang="zh-CN" altLang="en-US" dirty="0"/>
+              <a:t>所以为了不出现在前进过程中，</a:t>
+            </a:r>
+            <a:r>
+              <a:rPr lang="en-US" altLang="zh-CN" dirty="0" err="1"/>
+              <a:t>new_need_blocks</a:t>
+            </a:r>
+            <a:r>
+              <a:rPr lang="zh-CN" altLang="en-US" dirty="0"/>
+              <a:t>在解码过程中绘制出现的黑块区域，可以对</a:t>
+            </a:r>
+            <a:r>
+              <a:rPr lang="en-US" altLang="zh-CN" dirty="0" err="1"/>
+              <a:t>no_need_blocks</a:t>
+            </a:r>
+            <a:r>
+              <a:rPr lang="zh-CN" altLang="en-US" dirty="0"/>
+              <a:t>进行一部分保留，保留的是与新的相机视角相交但是因为</a:t>
+            </a:r>
+            <a:r>
+              <a:rPr lang="en-US" altLang="zh-CN" dirty="0" err="1"/>
+              <a:t>lod</a:t>
+            </a:r>
+            <a:r>
+              <a:rPr lang="zh-CN" altLang="en-US" dirty="0"/>
+              <a:t>被淘汰的部分，这部分数据块是因为混合分辨率绘制下当前不会用到的某一</a:t>
+            </a:r>
+            <a:r>
+              <a:rPr lang="en-US" altLang="zh-CN" dirty="0" err="1"/>
+              <a:t>lod</a:t>
+            </a:r>
+            <a:r>
+              <a:rPr lang="zh-CN" altLang="en-US" dirty="0"/>
+              <a:t>下的数据块，但是实际上光线是经过该数据块的，所以</a:t>
+            </a:r>
+            <a:r>
+              <a:rPr lang="en-US" altLang="zh-CN" dirty="0" err="1"/>
+              <a:t>raycast</a:t>
+            </a:r>
+            <a:r>
+              <a:rPr lang="zh-CN" altLang="en-US" dirty="0"/>
+              <a:t>的时候依然会采样到它，那么在该区域新的</a:t>
+            </a:r>
+            <a:r>
+              <a:rPr lang="en-US" altLang="zh-CN" dirty="0" err="1"/>
+              <a:t>lod</a:t>
+            </a:r>
+            <a:r>
+              <a:rPr lang="zh-CN" altLang="en-US" dirty="0"/>
+              <a:t>数据块解码完加载好之前，可以继续把它的</a:t>
+            </a:r>
+            <a:r>
+              <a:rPr lang="en-US" altLang="zh-CN" dirty="0"/>
+              <a:t>flag</a:t>
+            </a:r>
+            <a:r>
+              <a:rPr lang="zh-CN" altLang="en-US" dirty="0"/>
+              <a:t>置为</a:t>
+            </a:r>
+            <a:r>
+              <a:rPr lang="en-US" altLang="zh-CN" dirty="0"/>
+              <a:t>1</a:t>
+            </a:r>
+            <a:r>
+              <a:rPr lang="zh-CN" altLang="en-US" dirty="0"/>
+              <a:t>，从而待到效果，比如前景过程中，本来应该更细节的结果，但仍然是粗糙的结果，当新分辨率的加载进来后，会突然变清晰。</a:t>
+            </a:r>
+            <a:endParaRPr lang="en-US" altLang="zh-CN" dirty="0"/>
+          </a:p>
+          <a:p>
+            <a:endParaRPr lang="en-US" altLang="zh-CN" dirty="0"/>
+          </a:p>
+          <a:p>
+            <a:r>
+              <a:rPr lang="zh-CN" altLang="en-US" dirty="0"/>
+              <a:t>对于显存数据块的管理，每个数据块有五个成员变量：物理数据块在显存的位置，物理数据块所装载的虚拟数据块索引，数据块是否有效、是否缓存</a:t>
+            </a:r>
+            <a:endParaRPr lang="en-US" altLang="zh-CN" dirty="0"/>
+          </a:p>
+          <a:p>
+            <a:endParaRPr lang="en-US" altLang="zh-CN" dirty="0"/>
+          </a:p>
+          <a:p>
+            <a:r>
+              <a:rPr lang="zh-CN" altLang="en-US" dirty="0"/>
+              <a:t>每个</a:t>
+            </a:r>
+            <a:r>
+              <a:rPr lang="en-US" altLang="zh-CN" dirty="0" err="1"/>
+              <a:t>no_need_blocks</a:t>
+            </a:r>
+            <a:r>
+              <a:rPr lang="zh-CN" altLang="en-US" dirty="0"/>
+              <a:t>只需要将其对应的在显存的数据块的有效该为非法的即可，不需要把</a:t>
+            </a:r>
+            <a:r>
+              <a:rPr lang="en-US" altLang="zh-CN" dirty="0"/>
+              <a:t>flag</a:t>
+            </a:r>
+            <a:r>
+              <a:rPr lang="zh-CN" altLang="en-US" dirty="0"/>
+              <a:t>置为</a:t>
+            </a:r>
+            <a:r>
+              <a:rPr lang="en-US" altLang="zh-CN" dirty="0"/>
+              <a:t>1</a:t>
+            </a:r>
+            <a:r>
+              <a:rPr lang="zh-CN" altLang="en-US" dirty="0"/>
+              <a:t>，</a:t>
+            </a:r>
+            <a:endParaRPr lang="en-US" altLang="zh-CN" dirty="0"/>
+          </a:p>
+          <a:p>
+            <a:r>
+              <a:rPr lang="zh-CN" altLang="en-US" dirty="0"/>
+              <a:t>虽然这个数据块现在是非法的，但是它依然在显存中。</a:t>
+            </a:r>
+            <a:endParaRPr lang="en-US" altLang="zh-CN" dirty="0"/>
+          </a:p>
+          <a:p>
+            <a:r>
+              <a:rPr lang="zh-CN" altLang="en-US" dirty="0"/>
+              <a:t>另一方面非法是狭义的？指的是现在这个相机状态下，这个</a:t>
+            </a:r>
+            <a:r>
+              <a:rPr lang="en-US" altLang="zh-CN" dirty="0" err="1"/>
+              <a:t>lod</a:t>
+            </a:r>
+            <a:r>
+              <a:rPr lang="zh-CN" altLang="en-US" dirty="0"/>
+              <a:t>的数据块不需要用到，但是可以用到，因为真正需要用到的数据块可能还没解码加载好，但是它这个非法的标志表明它可以装载另外的虚拟数据块！这对于显存调度使用是有用的。</a:t>
+            </a:r>
+          </a:p>
+        </p:txBody>
+      </p:sp>
+    </p:spTree>
+    <p:extLst>
+      <p:ext uri="{BB962C8B-B14F-4D97-AF65-F5344CB8AC3E}">
+        <p14:creationId xmlns:p14="http://schemas.microsoft.com/office/powerpoint/2010/main" val="3871794789"/>
+      </p:ext>
+    </p:extLst>
+  </p:cSld>
+  <p:clrMapOvr>
+    <a:masterClrMapping/>
+  </p:clrMapOvr>
+</p:sld>
+</file>
+
+<file path=ppt/slides/slide3.xml><?xml version="1.0" encoding="utf-8"?>
+<p:sld xmlns:a="http://schemas.openxmlformats.org/drawingml/2006/main" xmlns:r="http://schemas.openxmlformats.org/officeDocument/2006/relationships" xmlns:p="http://schemas.openxmlformats.org/presentationml/2006/main">
+  <p:cSld>
+    <p:spTree>
+      <p:nvGrpSpPr>
+        <p:cNvPr id="1" name=""/>
+        <p:cNvGrpSpPr/>
+        <p:nvPr/>
+      </p:nvGrpSpPr>
+      <p:grpSpPr>
+        <a:xfrm>
+          <a:off x="0" y="0"/>
+          <a:ext cx="0" cy="0"/>
+          <a:chOff x="0" y="0"/>
+          <a:chExt cx="0" cy="0"/>
+        </a:xfrm>
+      </p:grpSpPr>
+    </p:spTree>
+    <p:extLst>
+      <p:ext uri="{BB962C8B-B14F-4D97-AF65-F5344CB8AC3E}">
+        <p14:creationId xmlns:p14="http://schemas.microsoft.com/office/powerpoint/2010/main" val="3055991875"/>
+      </p:ext>
+    </p:extLst>
+  </p:cSld>
+  <p:clrMapOvr>
+    <a:masterClrMapping/>
+  </p:clrMapOvr>
+</p:sld>
+</file>
+
 <file path=ppt/theme/theme1.xml><?xml version="1.0" encoding="utf-8"?>
 <a:theme xmlns:a="http://schemas.openxmlformats.org/drawingml/2006/main" name="Office 主题​​">
   <a:themeElements>

</xml_diff>